<commit_message>
Updated with Pos tagging to resolve  useless words in the plots. Updated readme and report. Switched fully to NLTK
</commit_message>
<xml_diff>
--- a/outputs/presentation/Yelp_NLP_Presentation_10_Slides.pptx
+++ b/outputs/presentation/Yelp_NLP_Presentation_10_Slides.pptx
@@ -5,18 +5,18 @@
     <p:sldMasterId id="2147483648" r:id="rId1"/>
   </p:sldMasterIdLst>
   <p:sldIdLst>
-    <p:sldId id="256" r:id="rId7"/>
-    <p:sldId id="257" r:id="rId8"/>
-    <p:sldId id="258" r:id="rId9"/>
-    <p:sldId id="259" r:id="rId10"/>
-    <p:sldId id="260" r:id="rId11"/>
-    <p:sldId id="261" r:id="rId12"/>
-    <p:sldId id="262" r:id="rId13"/>
-    <p:sldId id="263" r:id="rId14"/>
-    <p:sldId id="264" r:id="rId15"/>
-    <p:sldId id="265" r:id="rId16"/>
+    <p:sldId id="256" r:id="rId2"/>
+    <p:sldId id="257" r:id="rId3"/>
+    <p:sldId id="258" r:id="rId4"/>
+    <p:sldId id="259" r:id="rId5"/>
+    <p:sldId id="260" r:id="rId6"/>
+    <p:sldId id="261" r:id="rId7"/>
+    <p:sldId id="262" r:id="rId8"/>
+    <p:sldId id="263" r:id="rId9"/>
+    <p:sldId id="264" r:id="rId10"/>
+    <p:sldId id="265" r:id="rId11"/>
   </p:sldIdLst>
-  <p:sldSz cx="12191695" cy="6858000" type="screen4x3"/>
+  <p:sldSz cx="12192000" cy="6858000"/>
   <p:notesSz cx="6858000" cy="9144000"/>
   <p:defaultTextStyle>
     <a:defPPr>
@@ -113,6 +113,22 @@
       </a:defRPr>
     </a:lvl9pPr>
   </p:defaultTextStyle>
+  <p:extLst>
+    <p:ext uri="{EFAFB233-063F-42B5-8137-9DF3F51BA10A}">
+      <p15:sldGuideLst xmlns:p15="http://schemas.microsoft.com/office/powerpoint/2012/main">
+        <p15:guide id="1" orient="horz" pos="2160">
+          <p15:clr>
+            <a:srgbClr val="A4A3A4"/>
+          </p15:clr>
+        </p15:guide>
+        <p15:guide id="2" pos="2880">
+          <p15:clr>
+            <a:srgbClr val="A4A3A4"/>
+          </p15:clr>
+        </p15:guide>
+      </p15:sldGuideLst>
+    </p:ext>
+  </p:extLst>
 </p:presentation>
 </file>
 
@@ -154,10 +170,9 @@
           <a:lstStyle/>
           <a:p>
             <a:r>
-              <a:rPr lang="en-US" smtClean="0"/>
+              <a:rPr lang="en-US"/>
               <a:t>Click to edit Master title style</a:t>
             </a:r>
-            <a:endParaRPr lang="en-US"/>
           </a:p>
         </p:txBody>
       </p:sp>
@@ -273,10 +288,9 @@
           </a:lstStyle>
           <a:p>
             <a:r>
-              <a:rPr lang="en-US" smtClean="0"/>
+              <a:rPr lang="en-US"/>
               <a:t>Click to edit Master subtitle style</a:t>
             </a:r>
-            <a:endParaRPr lang="en-US"/>
           </a:p>
         </p:txBody>
       </p:sp>
@@ -297,7 +311,7 @@
           <a:p>
             <a:fld id="{5BCAD085-E8A6-8845-BD4E-CB4CCA059FC4}" type="datetimeFigureOut">
               <a:rPr lang="en-US" smtClean="0"/>
-              <a:t>1/27/13</a:t>
+              <a:t>2/8/26</a:t>
             </a:fld>
             <a:endParaRPr lang="en-US"/>
           </a:p>
@@ -391,10 +405,9 @@
           <a:lstStyle/>
           <a:p>
             <a:r>
-              <a:rPr lang="en-US" smtClean="0"/>
+              <a:rPr lang="en-US"/>
               <a:t>Click to edit Master title style</a:t>
             </a:r>
-            <a:endParaRPr lang="en-US"/>
           </a:p>
         </p:txBody>
       </p:sp>
@@ -415,38 +428,37 @@
           <a:p>
             <a:pPr lvl="0"/>
             <a:r>
-              <a:rPr lang="en-US" smtClean="0"/>
+              <a:rPr lang="en-US"/>
               <a:t>Click to edit Master text styles</a:t>
             </a:r>
           </a:p>
           <a:p>
             <a:pPr lvl="1"/>
             <a:r>
-              <a:rPr lang="en-US" smtClean="0"/>
+              <a:rPr lang="en-US"/>
               <a:t>Second level</a:t>
             </a:r>
           </a:p>
           <a:p>
             <a:pPr lvl="2"/>
             <a:r>
-              <a:rPr lang="en-US" smtClean="0"/>
+              <a:rPr lang="en-US"/>
               <a:t>Third level</a:t>
             </a:r>
           </a:p>
           <a:p>
             <a:pPr lvl="3"/>
             <a:r>
-              <a:rPr lang="en-US" smtClean="0"/>
+              <a:rPr lang="en-US"/>
               <a:t>Fourth level</a:t>
             </a:r>
           </a:p>
           <a:p>
             <a:pPr lvl="4"/>
             <a:r>
-              <a:rPr lang="en-US" smtClean="0"/>
+              <a:rPr lang="en-US"/>
               <a:t>Fifth level</a:t>
             </a:r>
-            <a:endParaRPr lang="en-US"/>
           </a:p>
         </p:txBody>
       </p:sp>
@@ -467,7 +479,7 @@
           <a:p>
             <a:fld id="{5BCAD085-E8A6-8845-BD4E-CB4CCA059FC4}" type="datetimeFigureOut">
               <a:rPr lang="en-US" smtClean="0"/>
-              <a:t>1/27/13</a:t>
+              <a:t>2/8/26</a:t>
             </a:fld>
             <a:endParaRPr lang="en-US"/>
           </a:p>
@@ -566,10 +578,9 @@
           <a:lstStyle/>
           <a:p>
             <a:r>
-              <a:rPr lang="en-US" smtClean="0"/>
+              <a:rPr lang="en-US"/>
               <a:t>Click to edit Master title style</a:t>
             </a:r>
-            <a:endParaRPr lang="en-US"/>
           </a:p>
         </p:txBody>
       </p:sp>
@@ -595,38 +606,37 @@
           <a:p>
             <a:pPr lvl="0"/>
             <a:r>
-              <a:rPr lang="en-US" smtClean="0"/>
+              <a:rPr lang="en-US"/>
               <a:t>Click to edit Master text styles</a:t>
             </a:r>
           </a:p>
           <a:p>
             <a:pPr lvl="1"/>
             <a:r>
-              <a:rPr lang="en-US" smtClean="0"/>
+              <a:rPr lang="en-US"/>
               <a:t>Second level</a:t>
             </a:r>
           </a:p>
           <a:p>
             <a:pPr lvl="2"/>
             <a:r>
-              <a:rPr lang="en-US" smtClean="0"/>
+              <a:rPr lang="en-US"/>
               <a:t>Third level</a:t>
             </a:r>
           </a:p>
           <a:p>
             <a:pPr lvl="3"/>
             <a:r>
-              <a:rPr lang="en-US" smtClean="0"/>
+              <a:rPr lang="en-US"/>
               <a:t>Fourth level</a:t>
             </a:r>
           </a:p>
           <a:p>
             <a:pPr lvl="4"/>
             <a:r>
-              <a:rPr lang="en-US" smtClean="0"/>
+              <a:rPr lang="en-US"/>
               <a:t>Fifth level</a:t>
             </a:r>
-            <a:endParaRPr lang="en-US"/>
           </a:p>
         </p:txBody>
       </p:sp>
@@ -647,7 +657,7 @@
           <a:p>
             <a:fld id="{5BCAD085-E8A6-8845-BD4E-CB4CCA059FC4}" type="datetimeFigureOut">
               <a:rPr lang="en-US" smtClean="0"/>
-              <a:t>1/27/13</a:t>
+              <a:t>2/8/26</a:t>
             </a:fld>
             <a:endParaRPr lang="en-US"/>
           </a:p>
@@ -741,10 +751,9 @@
           <a:lstStyle/>
           <a:p>
             <a:r>
-              <a:rPr lang="en-US" smtClean="0"/>
+              <a:rPr lang="en-US"/>
               <a:t>Click to edit Master title style</a:t>
             </a:r>
-            <a:endParaRPr lang="en-US"/>
           </a:p>
         </p:txBody>
       </p:sp>
@@ -765,38 +774,37 @@
           <a:p>
             <a:pPr lvl="0"/>
             <a:r>
-              <a:rPr lang="en-US" smtClean="0"/>
+              <a:rPr lang="en-US"/>
               <a:t>Click to edit Master text styles</a:t>
             </a:r>
           </a:p>
           <a:p>
             <a:pPr lvl="1"/>
             <a:r>
-              <a:rPr lang="en-US" smtClean="0"/>
+              <a:rPr lang="en-US"/>
               <a:t>Second level</a:t>
             </a:r>
           </a:p>
           <a:p>
             <a:pPr lvl="2"/>
             <a:r>
-              <a:rPr lang="en-US" smtClean="0"/>
+              <a:rPr lang="en-US"/>
               <a:t>Third level</a:t>
             </a:r>
           </a:p>
           <a:p>
             <a:pPr lvl="3"/>
             <a:r>
-              <a:rPr lang="en-US" smtClean="0"/>
+              <a:rPr lang="en-US"/>
               <a:t>Fourth level</a:t>
             </a:r>
           </a:p>
           <a:p>
             <a:pPr lvl="4"/>
             <a:r>
-              <a:rPr lang="en-US" smtClean="0"/>
+              <a:rPr lang="en-US"/>
               <a:t>Fifth level</a:t>
             </a:r>
-            <a:endParaRPr lang="en-US"/>
           </a:p>
         </p:txBody>
       </p:sp>
@@ -817,7 +825,7 @@
           <a:p>
             <a:fld id="{5BCAD085-E8A6-8845-BD4E-CB4CCA059FC4}" type="datetimeFigureOut">
               <a:rPr lang="en-US" smtClean="0"/>
-              <a:t>1/27/13</a:t>
+              <a:t>2/8/26</a:t>
             </a:fld>
             <a:endParaRPr lang="en-US"/>
           </a:p>
@@ -920,10 +928,9 @@
           </a:lstStyle>
           <a:p>
             <a:r>
-              <a:rPr lang="en-US" smtClean="0"/>
+              <a:rPr lang="en-US"/>
               <a:t>Click to edit Master title style</a:t>
             </a:r>
-            <a:endParaRPr lang="en-US"/>
           </a:p>
         </p:txBody>
       </p:sp>
@@ -1040,7 +1047,7 @@
           <a:p>
             <a:pPr lvl="0"/>
             <a:r>
-              <a:rPr lang="en-US" smtClean="0"/>
+              <a:rPr lang="en-US"/>
               <a:t>Click to edit Master text styles</a:t>
             </a:r>
           </a:p>
@@ -1063,7 +1070,7 @@
           <a:p>
             <a:fld id="{5BCAD085-E8A6-8845-BD4E-CB4CCA059FC4}" type="datetimeFigureOut">
               <a:rPr lang="en-US" smtClean="0"/>
-              <a:t>1/27/13</a:t>
+              <a:t>2/8/26</a:t>
             </a:fld>
             <a:endParaRPr lang="en-US"/>
           </a:p>
@@ -1157,10 +1164,9 @@
           <a:lstStyle/>
           <a:p>
             <a:r>
-              <a:rPr lang="en-US" smtClean="0"/>
+              <a:rPr lang="en-US"/>
               <a:t>Click to edit Master title style</a:t>
             </a:r>
-            <a:endParaRPr lang="en-US"/>
           </a:p>
         </p:txBody>
       </p:sp>
@@ -1214,38 +1220,37 @@
           <a:p>
             <a:pPr lvl="0"/>
             <a:r>
-              <a:rPr lang="en-US" smtClean="0"/>
+              <a:rPr lang="en-US"/>
               <a:t>Click to edit Master text styles</a:t>
             </a:r>
           </a:p>
           <a:p>
             <a:pPr lvl="1"/>
             <a:r>
-              <a:rPr lang="en-US" smtClean="0"/>
+              <a:rPr lang="en-US"/>
               <a:t>Second level</a:t>
             </a:r>
           </a:p>
           <a:p>
             <a:pPr lvl="2"/>
             <a:r>
-              <a:rPr lang="en-US" smtClean="0"/>
+              <a:rPr lang="en-US"/>
               <a:t>Third level</a:t>
             </a:r>
           </a:p>
           <a:p>
             <a:pPr lvl="3"/>
             <a:r>
-              <a:rPr lang="en-US" smtClean="0"/>
+              <a:rPr lang="en-US"/>
               <a:t>Fourth level</a:t>
             </a:r>
           </a:p>
           <a:p>
             <a:pPr lvl="4"/>
             <a:r>
-              <a:rPr lang="en-US" smtClean="0"/>
+              <a:rPr lang="en-US"/>
               <a:t>Fifth level</a:t>
             </a:r>
-            <a:endParaRPr lang="en-US"/>
           </a:p>
         </p:txBody>
       </p:sp>
@@ -1299,38 +1304,37 @@
           <a:p>
             <a:pPr lvl="0"/>
             <a:r>
-              <a:rPr lang="en-US" smtClean="0"/>
+              <a:rPr lang="en-US"/>
               <a:t>Click to edit Master text styles</a:t>
             </a:r>
           </a:p>
           <a:p>
             <a:pPr lvl="1"/>
             <a:r>
-              <a:rPr lang="en-US" smtClean="0"/>
+              <a:rPr lang="en-US"/>
               <a:t>Second level</a:t>
             </a:r>
           </a:p>
           <a:p>
             <a:pPr lvl="2"/>
             <a:r>
-              <a:rPr lang="en-US" smtClean="0"/>
+              <a:rPr lang="en-US"/>
               <a:t>Third level</a:t>
             </a:r>
           </a:p>
           <a:p>
             <a:pPr lvl="3"/>
             <a:r>
-              <a:rPr lang="en-US" smtClean="0"/>
+              <a:rPr lang="en-US"/>
               <a:t>Fourth level</a:t>
             </a:r>
           </a:p>
           <a:p>
             <a:pPr lvl="4"/>
             <a:r>
-              <a:rPr lang="en-US" smtClean="0"/>
+              <a:rPr lang="en-US"/>
               <a:t>Fifth level</a:t>
             </a:r>
-            <a:endParaRPr lang="en-US"/>
           </a:p>
         </p:txBody>
       </p:sp>
@@ -1351,7 +1355,7 @@
           <a:p>
             <a:fld id="{5BCAD085-E8A6-8845-BD4E-CB4CCA059FC4}" type="datetimeFigureOut">
               <a:rPr lang="en-US" smtClean="0"/>
-              <a:t>1/27/13</a:t>
+              <a:t>2/8/26</a:t>
             </a:fld>
             <a:endParaRPr lang="en-US"/>
           </a:p>
@@ -1449,10 +1453,9 @@
           </a:lstStyle>
           <a:p>
             <a:r>
-              <a:rPr lang="en-US" smtClean="0"/>
+              <a:rPr lang="en-US"/>
               <a:t>Click to edit Master title style</a:t>
             </a:r>
-            <a:endParaRPr lang="en-US"/>
           </a:p>
         </p:txBody>
       </p:sp>
@@ -1515,7 +1518,7 @@
           <a:p>
             <a:pPr lvl="0"/>
             <a:r>
-              <a:rPr lang="en-US" smtClean="0"/>
+              <a:rPr lang="en-US"/>
               <a:t>Click to edit Master text styles</a:t>
             </a:r>
           </a:p>
@@ -1571,38 +1574,37 @@
           <a:p>
             <a:pPr lvl="0"/>
             <a:r>
-              <a:rPr lang="en-US" smtClean="0"/>
+              <a:rPr lang="en-US"/>
               <a:t>Click to edit Master text styles</a:t>
             </a:r>
           </a:p>
           <a:p>
             <a:pPr lvl="1"/>
             <a:r>
-              <a:rPr lang="en-US" smtClean="0"/>
+              <a:rPr lang="en-US"/>
               <a:t>Second level</a:t>
             </a:r>
           </a:p>
           <a:p>
             <a:pPr lvl="2"/>
             <a:r>
-              <a:rPr lang="en-US" smtClean="0"/>
+              <a:rPr lang="en-US"/>
               <a:t>Third level</a:t>
             </a:r>
           </a:p>
           <a:p>
             <a:pPr lvl="3"/>
             <a:r>
-              <a:rPr lang="en-US" smtClean="0"/>
+              <a:rPr lang="en-US"/>
               <a:t>Fourth level</a:t>
             </a:r>
           </a:p>
           <a:p>
             <a:pPr lvl="4"/>
             <a:r>
-              <a:rPr lang="en-US" smtClean="0"/>
+              <a:rPr lang="en-US"/>
               <a:t>Fifth level</a:t>
             </a:r>
-            <a:endParaRPr lang="en-US"/>
           </a:p>
         </p:txBody>
       </p:sp>
@@ -1665,7 +1667,7 @@
           <a:p>
             <a:pPr lvl="0"/>
             <a:r>
-              <a:rPr lang="en-US" smtClean="0"/>
+              <a:rPr lang="en-US"/>
               <a:t>Click to edit Master text styles</a:t>
             </a:r>
           </a:p>
@@ -1721,38 +1723,37 @@
           <a:p>
             <a:pPr lvl="0"/>
             <a:r>
-              <a:rPr lang="en-US" smtClean="0"/>
+              <a:rPr lang="en-US"/>
               <a:t>Click to edit Master text styles</a:t>
             </a:r>
           </a:p>
           <a:p>
             <a:pPr lvl="1"/>
             <a:r>
-              <a:rPr lang="en-US" smtClean="0"/>
+              <a:rPr lang="en-US"/>
               <a:t>Second level</a:t>
             </a:r>
           </a:p>
           <a:p>
             <a:pPr lvl="2"/>
             <a:r>
-              <a:rPr lang="en-US" smtClean="0"/>
+              <a:rPr lang="en-US"/>
               <a:t>Third level</a:t>
             </a:r>
           </a:p>
           <a:p>
             <a:pPr lvl="3"/>
             <a:r>
-              <a:rPr lang="en-US" smtClean="0"/>
+              <a:rPr lang="en-US"/>
               <a:t>Fourth level</a:t>
             </a:r>
           </a:p>
           <a:p>
             <a:pPr lvl="4"/>
             <a:r>
-              <a:rPr lang="en-US" smtClean="0"/>
+              <a:rPr lang="en-US"/>
               <a:t>Fifth level</a:t>
             </a:r>
-            <a:endParaRPr lang="en-US"/>
           </a:p>
         </p:txBody>
       </p:sp>
@@ -1773,7 +1774,7 @@
           <a:p>
             <a:fld id="{5BCAD085-E8A6-8845-BD4E-CB4CCA059FC4}" type="datetimeFigureOut">
               <a:rPr lang="en-US" smtClean="0"/>
-              <a:t>1/27/13</a:t>
+              <a:t>2/8/26</a:t>
             </a:fld>
             <a:endParaRPr lang="en-US"/>
           </a:p>
@@ -1867,10 +1868,9 @@
           <a:lstStyle/>
           <a:p>
             <a:r>
-              <a:rPr lang="en-US" smtClean="0"/>
+              <a:rPr lang="en-US"/>
               <a:t>Click to edit Master title style</a:t>
             </a:r>
-            <a:endParaRPr lang="en-US"/>
           </a:p>
         </p:txBody>
       </p:sp>
@@ -1891,7 +1891,7 @@
           <a:p>
             <a:fld id="{5BCAD085-E8A6-8845-BD4E-CB4CCA059FC4}" type="datetimeFigureOut">
               <a:rPr lang="en-US" smtClean="0"/>
-              <a:t>1/27/13</a:t>
+              <a:t>2/8/26</a:t>
             </a:fld>
             <a:endParaRPr lang="en-US"/>
           </a:p>
@@ -1986,7 +1986,7 @@
           <a:p>
             <a:fld id="{5BCAD085-E8A6-8845-BD4E-CB4CCA059FC4}" type="datetimeFigureOut">
               <a:rPr lang="en-US" smtClean="0"/>
-              <a:t>1/27/13</a:t>
+              <a:t>2/8/26</a:t>
             </a:fld>
             <a:endParaRPr lang="en-US"/>
           </a:p>
@@ -2089,10 +2089,9 @@
           </a:lstStyle>
           <a:p>
             <a:r>
-              <a:rPr lang="en-US" smtClean="0"/>
+              <a:rPr lang="en-US"/>
               <a:t>Click to edit Master title style</a:t>
             </a:r>
-            <a:endParaRPr lang="en-US"/>
           </a:p>
         </p:txBody>
       </p:sp>
@@ -2146,38 +2145,37 @@
           <a:p>
             <a:pPr lvl="0"/>
             <a:r>
-              <a:rPr lang="en-US" smtClean="0"/>
+              <a:rPr lang="en-US"/>
               <a:t>Click to edit Master text styles</a:t>
             </a:r>
           </a:p>
           <a:p>
             <a:pPr lvl="1"/>
             <a:r>
-              <a:rPr lang="en-US" smtClean="0"/>
+              <a:rPr lang="en-US"/>
               <a:t>Second level</a:t>
             </a:r>
           </a:p>
           <a:p>
             <a:pPr lvl="2"/>
             <a:r>
-              <a:rPr lang="en-US" smtClean="0"/>
+              <a:rPr lang="en-US"/>
               <a:t>Third level</a:t>
             </a:r>
           </a:p>
           <a:p>
             <a:pPr lvl="3"/>
             <a:r>
-              <a:rPr lang="en-US" smtClean="0"/>
+              <a:rPr lang="en-US"/>
               <a:t>Fourth level</a:t>
             </a:r>
           </a:p>
           <a:p>
             <a:pPr lvl="4"/>
             <a:r>
-              <a:rPr lang="en-US" smtClean="0"/>
+              <a:rPr lang="en-US"/>
               <a:t>Fifth level</a:t>
             </a:r>
-            <a:endParaRPr lang="en-US"/>
           </a:p>
         </p:txBody>
       </p:sp>
@@ -2240,7 +2238,7 @@
           <a:p>
             <a:pPr lvl="0"/>
             <a:r>
-              <a:rPr lang="en-US" smtClean="0"/>
+              <a:rPr lang="en-US"/>
               <a:t>Click to edit Master text styles</a:t>
             </a:r>
           </a:p>
@@ -2263,7 +2261,7 @@
           <a:p>
             <a:fld id="{5BCAD085-E8A6-8845-BD4E-CB4CCA059FC4}" type="datetimeFigureOut">
               <a:rPr lang="en-US" smtClean="0"/>
-              <a:t>1/27/13</a:t>
+              <a:t>2/8/26</a:t>
             </a:fld>
             <a:endParaRPr lang="en-US"/>
           </a:p>
@@ -2366,10 +2364,9 @@
           </a:lstStyle>
           <a:p>
             <a:r>
-              <a:rPr lang="en-US" smtClean="0"/>
+              <a:rPr lang="en-US"/>
               <a:t>Click to edit Master title style</a:t>
             </a:r>
-            <a:endParaRPr lang="en-US"/>
           </a:p>
         </p:txBody>
       </p:sp>
@@ -2493,7 +2490,7 @@
           <a:p>
             <a:pPr lvl="0"/>
             <a:r>
-              <a:rPr lang="en-US" smtClean="0"/>
+              <a:rPr lang="en-US"/>
               <a:t>Click to edit Master text styles</a:t>
             </a:r>
           </a:p>
@@ -2516,7 +2513,7 @@
           <a:p>
             <a:fld id="{5BCAD085-E8A6-8845-BD4E-CB4CCA059FC4}" type="datetimeFigureOut">
               <a:rPr lang="en-US" smtClean="0"/>
-              <a:t>1/27/13</a:t>
+              <a:t>2/8/26</a:t>
             </a:fld>
             <a:endParaRPr lang="en-US"/>
           </a:p>
@@ -2625,10 +2622,9 @@
           <a:lstStyle/>
           <a:p>
             <a:r>
-              <a:rPr lang="en-US" smtClean="0"/>
+              <a:rPr lang="en-US"/>
               <a:t>Click to edit Master title style</a:t>
             </a:r>
-            <a:endParaRPr lang="en-US"/>
           </a:p>
         </p:txBody>
       </p:sp>
@@ -2659,38 +2655,37 @@
           <a:p>
             <a:pPr lvl="0"/>
             <a:r>
-              <a:rPr lang="en-US" smtClean="0"/>
+              <a:rPr lang="en-US"/>
               <a:t>Click to edit Master text styles</a:t>
             </a:r>
           </a:p>
           <a:p>
             <a:pPr lvl="1"/>
             <a:r>
-              <a:rPr lang="en-US" smtClean="0"/>
+              <a:rPr lang="en-US"/>
               <a:t>Second level</a:t>
             </a:r>
           </a:p>
           <a:p>
             <a:pPr lvl="2"/>
             <a:r>
-              <a:rPr lang="en-US" smtClean="0"/>
+              <a:rPr lang="en-US"/>
               <a:t>Third level</a:t>
             </a:r>
           </a:p>
           <a:p>
             <a:pPr lvl="3"/>
             <a:r>
-              <a:rPr lang="en-US" smtClean="0"/>
+              <a:rPr lang="en-US"/>
               <a:t>Fourth level</a:t>
             </a:r>
           </a:p>
           <a:p>
             <a:pPr lvl="4"/>
             <a:r>
-              <a:rPr lang="en-US" smtClean="0"/>
+              <a:rPr lang="en-US"/>
               <a:t>Fifth level</a:t>
             </a:r>
-            <a:endParaRPr lang="en-US"/>
           </a:p>
         </p:txBody>
       </p:sp>
@@ -2729,7 +2724,7 @@
           <a:p>
             <a:fld id="{5BCAD085-E8A6-8845-BD4E-CB4CCA059FC4}" type="datetimeFigureOut">
               <a:rPr lang="en-US" smtClean="0"/>
-              <a:t>1/27/13</a:t>
+              <a:t>2/8/26</a:t>
             </a:fld>
             <a:endParaRPr lang="en-US"/>
           </a:p>
@@ -3088,7 +3083,7 @@
 </file>
 
 <file path=ppt/slides/slide1.xml><?xml version="1.0" encoding="utf-8"?>
-<p:sld xmlns:a="http://schemas.openxmlformats.org/drawingml/2006/main" xmlns:p="http://schemas.openxmlformats.org/presentationml/2006/main" xmlns:r="http://schemas.openxmlformats.org/officeDocument/2006/relationships">
+<p:sld xmlns:a="http://schemas.openxmlformats.org/drawingml/2006/main" xmlns:r="http://schemas.openxmlformats.org/officeDocument/2006/relationships" xmlns:p="http://schemas.openxmlformats.org/presentationml/2006/main">
   <p:cSld>
     <p:spTree>
       <p:nvGrpSpPr>
@@ -3096,7 +3091,14 @@
         <p:cNvGrpSpPr/>
         <p:nvPr/>
       </p:nvGrpSpPr>
-      <p:grpSpPr/>
+      <p:grpSpPr>
+        <a:xfrm>
+          <a:off x="0" y="0"/>
+          <a:ext cx="0" cy="0"/>
+          <a:chOff x="0" y="0"/>
+          <a:chExt cx="0" cy="0"/>
+        </a:xfrm>
+      </p:grpSpPr>
       <p:sp>
         <p:nvSpPr>
           <p:cNvPr id="2" name="Title 1"/>
@@ -3184,8 +3186,8 @@
         </p:blipFill>
         <p:spPr>
           <a:xfrm>
-            <a:off x="6126480" y="1371600"/>
-            <a:ext cx="5577840" cy="4389120"/>
+            <a:off x="6811045" y="2604420"/>
+            <a:ext cx="4710395" cy="3706540"/>
           </a:xfrm>
           <a:prstGeom prst="rect">
             <a:avLst/>
@@ -3232,7 +3234,7 @@
 </file>
 
 <file path=ppt/slides/slide10.xml><?xml version="1.0" encoding="utf-8"?>
-<p:sld xmlns:a="http://schemas.openxmlformats.org/drawingml/2006/main" xmlns:p="http://schemas.openxmlformats.org/presentationml/2006/main" xmlns:r="http://schemas.openxmlformats.org/officeDocument/2006/relationships">
+<p:sld xmlns:a="http://schemas.openxmlformats.org/drawingml/2006/main" xmlns:r="http://schemas.openxmlformats.org/officeDocument/2006/relationships" xmlns:p="http://schemas.openxmlformats.org/presentationml/2006/main">
   <p:cSld>
     <p:spTree>
       <p:nvGrpSpPr>
@@ -3240,7 +3242,14 @@
         <p:cNvGrpSpPr/>
         <p:nvPr/>
       </p:nvGrpSpPr>
-      <p:grpSpPr/>
+      <p:grpSpPr>
+        <a:xfrm>
+          <a:off x="0" y="0"/>
+          <a:ext cx="0" cy="0"/>
+          <a:chOff x="0" y="0"/>
+          <a:chExt cx="0" cy="0"/>
+        </a:xfrm>
+      </p:grpSpPr>
       <p:sp>
         <p:nvSpPr>
           <p:cNvPr id="2" name="Title 1"/>
@@ -3383,7 +3392,7 @@
 </file>
 
 <file path=ppt/slides/slide2.xml><?xml version="1.0" encoding="utf-8"?>
-<p:sld xmlns:a="http://schemas.openxmlformats.org/drawingml/2006/main" xmlns:p="http://schemas.openxmlformats.org/presentationml/2006/main" xmlns:r="http://schemas.openxmlformats.org/officeDocument/2006/relationships">
+<p:sld xmlns:a="http://schemas.openxmlformats.org/drawingml/2006/main" xmlns:r="http://schemas.openxmlformats.org/officeDocument/2006/relationships" xmlns:p="http://schemas.openxmlformats.org/presentationml/2006/main">
   <p:cSld>
     <p:spTree>
       <p:nvGrpSpPr>
@@ -3391,7 +3400,14 @@
         <p:cNvGrpSpPr/>
         <p:nvPr/>
       </p:nvGrpSpPr>
-      <p:grpSpPr/>
+      <p:grpSpPr>
+        <a:xfrm>
+          <a:off x="0" y="0"/>
+          <a:ext cx="0" cy="0"/>
+          <a:chOff x="0" y="0"/>
+          <a:chExt cx="0" cy="0"/>
+        </a:xfrm>
+      </p:grpSpPr>
       <p:sp>
         <p:nvSpPr>
           <p:cNvPr id="2" name="Title 1"/>
@@ -3496,6 +3512,7 @@
             <a:pPr>
               <a:defRPr sz="1800"/>
             </a:pPr>
+            <a:endParaRPr/>
           </a:p>
           <a:p>
             <a:pPr>
@@ -3571,7 +3588,7 @@
 </file>
 
 <file path=ppt/slides/slide3.xml><?xml version="1.0" encoding="utf-8"?>
-<p:sld xmlns:a="http://schemas.openxmlformats.org/drawingml/2006/main" xmlns:p="http://schemas.openxmlformats.org/presentationml/2006/main" xmlns:r="http://schemas.openxmlformats.org/officeDocument/2006/relationships">
+<p:sld xmlns:a="http://schemas.openxmlformats.org/drawingml/2006/main" xmlns:r="http://schemas.openxmlformats.org/officeDocument/2006/relationships" xmlns:p="http://schemas.openxmlformats.org/presentationml/2006/main">
   <p:cSld>
     <p:spTree>
       <p:nvGrpSpPr>
@@ -3579,7 +3596,14 @@
         <p:cNvGrpSpPr/>
         <p:nvPr/>
       </p:nvGrpSpPr>
-      <p:grpSpPr/>
+      <p:grpSpPr>
+        <a:xfrm>
+          <a:off x="0" y="0"/>
+          <a:ext cx="0" cy="0"/>
+          <a:chOff x="0" y="0"/>
+          <a:chExt cx="0" cy="0"/>
+        </a:xfrm>
+      </p:grpSpPr>
       <p:sp>
         <p:nvSpPr>
           <p:cNvPr id="2" name="Title 1"/>
@@ -3630,6 +3654,7 @@
               <a:defRPr sz="2200"/>
             </a:pPr>
             <a:r>
+              <a:rPr dirty="0"/>
               <a:t>Dataset: Yelp Academic Dataset (Philadelphia restaurants).</a:t>
             </a:r>
           </a:p>
@@ -3638,6 +3663,7 @@
               <a:defRPr sz="2200"/>
             </a:pPr>
             <a:r>
+              <a:rPr dirty="0"/>
               <a:t>Working sample size: 100,000 reviews.</a:t>
             </a:r>
           </a:p>
@@ -3646,6 +3672,7 @@
               <a:defRPr sz="2200"/>
             </a:pPr>
             <a:r>
+              <a:rPr dirty="0"/>
               <a:t>Real customer language from real restaurant experiences.</a:t>
             </a:r>
           </a:p>
@@ -3659,7 +3686,7 @@
         </p:nvSpPr>
         <p:spPr>
           <a:xfrm>
-            <a:off x="6766560" y="1645920"/>
+            <a:off x="6787581" y="3108642"/>
             <a:ext cx="5029200" cy="3474720"/>
           </a:xfrm>
           <a:prstGeom prst="rect">
@@ -3677,6 +3704,7 @@
               <a:defRPr sz="1600"/>
             </a:pPr>
             <a:r>
+              <a:rPr dirty="0"/>
               <a:t>Example row (raw review):</a:t>
             </a:r>
           </a:p>
@@ -3685,6 +3713,7 @@
               <a:defRPr sz="1600"/>
             </a:pPr>
             <a:r>
+              <a:rPr dirty="0"/>
               <a:t>"Wow!  Yummy, different,  delicious.   Our favorite is the lamb curry and korma.  With 10 different kinds of naan!!!  Don't let the outside deter you (because we almost..."</a:t>
             </a:r>
           </a:p>
@@ -3730,7 +3759,7 @@
 </file>
 
 <file path=ppt/slides/slide4.xml><?xml version="1.0" encoding="utf-8"?>
-<p:sld xmlns:a="http://schemas.openxmlformats.org/drawingml/2006/main" xmlns:p="http://schemas.openxmlformats.org/presentationml/2006/main" xmlns:r="http://schemas.openxmlformats.org/officeDocument/2006/relationships">
+<p:sld xmlns:a="http://schemas.openxmlformats.org/drawingml/2006/main" xmlns:r="http://schemas.openxmlformats.org/officeDocument/2006/relationships" xmlns:p="http://schemas.openxmlformats.org/presentationml/2006/main">
   <p:cSld>
     <p:spTree>
       <p:nvGrpSpPr>
@@ -3738,7 +3767,14 @@
         <p:cNvGrpSpPr/>
         <p:nvPr/>
       </p:nvGrpSpPr>
-      <p:grpSpPr/>
+      <p:grpSpPr>
+        <a:xfrm>
+          <a:off x="0" y="0"/>
+          <a:ext cx="0" cy="0"/>
+          <a:chOff x="0" y="0"/>
+          <a:chExt cx="0" cy="0"/>
+        </a:xfrm>
+      </p:grpSpPr>
       <p:sp>
         <p:nvSpPr>
           <p:cNvPr id="2" name="Title 1"/>
@@ -3818,7 +3854,7 @@
         </p:nvSpPr>
         <p:spPr>
           <a:xfrm>
-            <a:off x="6583680" y="1645920"/>
+            <a:off x="6688784" y="3017202"/>
             <a:ext cx="5120640" cy="3566160"/>
           </a:xfrm>
           <a:prstGeom prst="rect">
@@ -3836,6 +3872,7 @@
               <a:defRPr sz="1600"/>
             </a:pPr>
             <a:r>
+              <a:rPr dirty="0"/>
               <a:t># reservoir sampling</a:t>
             </a:r>
           </a:p>
@@ -3844,7 +3881,32 @@
               <a:defRPr sz="1600"/>
             </a:pPr>
             <a:r>
-              <a:t>if len(sampled_rows) &lt; max_reviews:</a:t>
+              <a:rPr dirty="0"/>
+              <a:t>if </a:t>
+            </a:r>
+            <a:r>
+              <a:rPr dirty="0" err="1"/>
+              <a:t>len</a:t>
+            </a:r>
+            <a:r>
+              <a:rPr dirty="0"/>
+              <a:t>(</a:t>
+            </a:r>
+            <a:r>
+              <a:rPr dirty="0" err="1"/>
+              <a:t>sampled_rows</a:t>
+            </a:r>
+            <a:r>
+              <a:rPr dirty="0"/>
+              <a:t>) &lt; </a:t>
+            </a:r>
+            <a:r>
+              <a:rPr dirty="0" err="1"/>
+              <a:t>max_reviews</a:t>
+            </a:r>
+            <a:r>
+              <a:rPr dirty="0"/>
+              <a:t>:</a:t>
             </a:r>
           </a:p>
           <a:p>
@@ -3852,7 +3914,16 @@
               <a:defRPr sz="1600"/>
             </a:pPr>
             <a:r>
-              <a:t>    sampled_rows.append(row)</a:t>
+              <a:rPr dirty="0"/>
+              <a:t>    </a:t>
+            </a:r>
+            <a:r>
+              <a:rPr dirty="0" err="1"/>
+              <a:t>sampled_rows.append</a:t>
+            </a:r>
+            <a:r>
+              <a:rPr dirty="0"/>
+              <a:t>(row)</a:t>
             </a:r>
           </a:p>
           <a:p>
@@ -3860,6 +3931,7 @@
               <a:defRPr sz="1600"/>
             </a:pPr>
             <a:r>
+              <a:rPr dirty="0"/>
               <a:t>else:</a:t>
             </a:r>
           </a:p>
@@ -3868,7 +3940,32 @@
               <a:defRPr sz="1600"/>
             </a:pPr>
             <a:r>
-              <a:t>    idx = random_generator.randint(1, seen_matching_reviews)</a:t>
+              <a:rPr dirty="0"/>
+              <a:t>    </a:t>
+            </a:r>
+            <a:r>
+              <a:rPr dirty="0" err="1"/>
+              <a:t>idx</a:t>
+            </a:r>
+            <a:r>
+              <a:rPr dirty="0"/>
+              <a:t> = </a:t>
+            </a:r>
+            <a:r>
+              <a:rPr dirty="0" err="1"/>
+              <a:t>random_generator.randint</a:t>
+            </a:r>
+            <a:r>
+              <a:rPr dirty="0"/>
+              <a:t>(1, </a:t>
+            </a:r>
+            <a:r>
+              <a:rPr dirty="0" err="1"/>
+              <a:t>seen_matching_reviews</a:t>
+            </a:r>
+            <a:r>
+              <a:rPr dirty="0"/>
+              <a:t>)</a:t>
             </a:r>
           </a:p>
           <a:p>
@@ -3876,7 +3973,24 @@
               <a:defRPr sz="1600"/>
             </a:pPr>
             <a:r>
-              <a:t>    if idx &lt;= max_reviews:</a:t>
+              <a:rPr dirty="0"/>
+              <a:t>    if </a:t>
+            </a:r>
+            <a:r>
+              <a:rPr dirty="0" err="1"/>
+              <a:t>idx</a:t>
+            </a:r>
+            <a:r>
+              <a:rPr dirty="0"/>
+              <a:t> &lt;= </a:t>
+            </a:r>
+            <a:r>
+              <a:rPr dirty="0" err="1"/>
+              <a:t>max_reviews</a:t>
+            </a:r>
+            <a:r>
+              <a:rPr dirty="0"/>
+              <a:t>:</a:t>
             </a:r>
           </a:p>
           <a:p>
@@ -3884,7 +3998,24 @@
               <a:defRPr sz="1600"/>
             </a:pPr>
             <a:r>
-              <a:t>        sampled_rows[idx - 1] = row</a:t>
+              <a:rPr dirty="0"/>
+              <a:t>        </a:t>
+            </a:r>
+            <a:r>
+              <a:rPr dirty="0" err="1"/>
+              <a:t>sampled_rows</a:t>
+            </a:r>
+            <a:r>
+              <a:rPr dirty="0"/>
+              <a:t>[</a:t>
+            </a:r>
+            <a:r>
+              <a:rPr dirty="0" err="1"/>
+              <a:t>idx</a:t>
+            </a:r>
+            <a:r>
+              <a:rPr dirty="0"/>
+              <a:t> - 1] = row</a:t>
             </a:r>
           </a:p>
         </p:txBody>
@@ -3929,7 +4060,7 @@
 </file>
 
 <file path=ppt/slides/slide5.xml><?xml version="1.0" encoding="utf-8"?>
-<p:sld xmlns:a="http://schemas.openxmlformats.org/drawingml/2006/main" xmlns:p="http://schemas.openxmlformats.org/presentationml/2006/main" xmlns:r="http://schemas.openxmlformats.org/officeDocument/2006/relationships">
+<p:sld xmlns:a="http://schemas.openxmlformats.org/drawingml/2006/main" xmlns:r="http://schemas.openxmlformats.org/officeDocument/2006/relationships" xmlns:p="http://schemas.openxmlformats.org/presentationml/2006/main">
   <p:cSld>
     <p:spTree>
       <p:nvGrpSpPr>
@@ -3937,7 +4068,14 @@
         <p:cNvGrpSpPr/>
         <p:nvPr/>
       </p:nvGrpSpPr>
-      <p:grpSpPr/>
+      <p:grpSpPr>
+        <a:xfrm>
+          <a:off x="0" y="0"/>
+          <a:ext cx="0" cy="0"/>
+          <a:chOff x="0" y="0"/>
+          <a:chExt cx="0" cy="0"/>
+        </a:xfrm>
+      </p:grpSpPr>
       <p:sp>
         <p:nvSpPr>
           <p:cNvPr id="2" name="Title 1"/>
@@ -4017,7 +4155,7 @@
         </p:nvSpPr>
         <p:spPr>
           <a:xfrm>
-            <a:off x="6400800" y="1463040"/>
+            <a:off x="6379779" y="2834640"/>
             <a:ext cx="5394960" cy="4206240"/>
           </a:xfrm>
           <a:prstGeom prst="rect">
@@ -4035,6 +4173,7 @@
               <a:defRPr sz="1400"/>
             </a:pPr>
             <a:r>
+              <a:rPr dirty="0"/>
               <a:t>Before (text):</a:t>
             </a:r>
           </a:p>
@@ -4043,6 +4182,7 @@
               <a:defRPr sz="1400"/>
             </a:pPr>
             <a:r>
+              <a:rPr dirty="0"/>
               <a:t>"Wow!  Yummy, different,  delicious.   Our favorite is the lamb curry and korma.  With 10 different kinds of naan!!!  Don't let the outside deter you (because we almost..."</a:t>
             </a:r>
           </a:p>
@@ -4050,13 +4190,23 @@
             <a:pPr>
               <a:defRPr sz="1400"/>
             </a:pPr>
+            <a:endParaRPr dirty="0"/>
           </a:p>
           <a:p>
             <a:pPr>
               <a:defRPr sz="1400"/>
             </a:pPr>
             <a:r>
-              <a:t>After (cleaned_text):</a:t>
+              <a:rPr dirty="0"/>
+              <a:t>After (</a:t>
+            </a:r>
+            <a:r>
+              <a:rPr dirty="0" err="1"/>
+              <a:t>cleaned_text</a:t>
+            </a:r>
+            <a:r>
+              <a:rPr dirty="0"/>
+              <a:t>):</a:t>
             </a:r>
           </a:p>
           <a:p>
@@ -4064,6 +4214,7 @@
               <a:defRPr sz="1400"/>
             </a:pPr>
             <a:r>
+              <a:rPr dirty="0"/>
               <a:t>"wow yummy different delicious favorite lamb curry korma different kind naan let outside deter change try new glad"</a:t>
             </a:r>
           </a:p>
@@ -4109,7 +4260,7 @@
 </file>
 
 <file path=ppt/slides/slide6.xml><?xml version="1.0" encoding="utf-8"?>
-<p:sld xmlns:a="http://schemas.openxmlformats.org/drawingml/2006/main" xmlns:p="http://schemas.openxmlformats.org/presentationml/2006/main" xmlns:r="http://schemas.openxmlformats.org/officeDocument/2006/relationships">
+<p:sld xmlns:a="http://schemas.openxmlformats.org/drawingml/2006/main" xmlns:r="http://schemas.openxmlformats.org/officeDocument/2006/relationships" xmlns:p="http://schemas.openxmlformats.org/presentationml/2006/main">
   <p:cSld>
     <p:spTree>
       <p:nvGrpSpPr>
@@ -4117,7 +4268,14 @@
         <p:cNvGrpSpPr/>
         <p:nvPr/>
       </p:nvGrpSpPr>
-      <p:grpSpPr/>
+      <p:grpSpPr>
+        <a:xfrm>
+          <a:off x="0" y="0"/>
+          <a:ext cx="0" cy="0"/>
+          <a:chOff x="0" y="0"/>
+          <a:chExt cx="0" cy="0"/>
+        </a:xfrm>
+      </p:grpSpPr>
       <p:sp>
         <p:nvSpPr>
           <p:cNvPr id="2" name="Title 1"/>
@@ -4168,6 +4326,7 @@
               <a:defRPr sz="2200"/>
             </a:pPr>
             <a:r>
+              <a:rPr dirty="0"/>
               <a:t>Separate topic models were built for positive and negative reviews.</a:t>
             </a:r>
           </a:p>
@@ -4176,6 +4335,7 @@
               <a:defRPr sz="2200"/>
             </a:pPr>
             <a:r>
+              <a:rPr dirty="0"/>
               <a:t>Positive and negative groups focus on different recurring themes.</a:t>
             </a:r>
           </a:p>
@@ -4184,6 +4344,7 @@
               <a:defRPr sz="2200"/>
             </a:pPr>
             <a:r>
+              <a:rPr dirty="0"/>
               <a:t>This helps explain what customers talk about by sentiment.</a:t>
             </a:r>
           </a:p>
@@ -4205,7 +4366,7 @@
         </p:blipFill>
         <p:spPr>
           <a:xfrm>
-            <a:off x="640080" y="1828800"/>
+            <a:off x="640080" y="2240280"/>
             <a:ext cx="5577840" cy="4297680"/>
           </a:xfrm>
           <a:prstGeom prst="rect">
@@ -4229,7 +4390,7 @@
         </p:blipFill>
         <p:spPr>
           <a:xfrm>
-            <a:off x="6309360" y="1828800"/>
+            <a:off x="6309360" y="2240280"/>
             <a:ext cx="5577840" cy="4297680"/>
           </a:xfrm>
           <a:prstGeom prst="rect">
@@ -4277,7 +4438,7 @@
 </file>
 
 <file path=ppt/slides/slide7.xml><?xml version="1.0" encoding="utf-8"?>
-<p:sld xmlns:a="http://schemas.openxmlformats.org/drawingml/2006/main" xmlns:p="http://schemas.openxmlformats.org/presentationml/2006/main" xmlns:r="http://schemas.openxmlformats.org/officeDocument/2006/relationships">
+<p:sld xmlns:a="http://schemas.openxmlformats.org/drawingml/2006/main" xmlns:r="http://schemas.openxmlformats.org/officeDocument/2006/relationships" xmlns:p="http://schemas.openxmlformats.org/presentationml/2006/main">
   <p:cSld>
     <p:spTree>
       <p:nvGrpSpPr>
@@ -4285,7 +4446,14 @@
         <p:cNvGrpSpPr/>
         <p:nvPr/>
       </p:nvGrpSpPr>
-      <p:grpSpPr/>
+      <p:grpSpPr>
+        <a:xfrm>
+          <a:off x="0" y="0"/>
+          <a:ext cx="0" cy="0"/>
+          <a:chOff x="0" y="0"/>
+          <a:chExt cx="0" cy="0"/>
+        </a:xfrm>
+      </p:grpSpPr>
       <p:sp>
         <p:nvSpPr>
           <p:cNvPr id="2" name="Title 1"/>
@@ -4390,6 +4558,7 @@
             <a:pPr>
               <a:defRPr sz="2200"/>
             </a:pPr>
+            <a:endParaRPr/>
           </a:p>
           <a:p>
             <a:pPr>
@@ -4449,7 +4618,7 @@
 </file>
 
 <file path=ppt/slides/slide8.xml><?xml version="1.0" encoding="utf-8"?>
-<p:sld xmlns:a="http://schemas.openxmlformats.org/drawingml/2006/main" xmlns:p="http://schemas.openxmlformats.org/presentationml/2006/main" xmlns:r="http://schemas.openxmlformats.org/officeDocument/2006/relationships">
+<p:sld xmlns:a="http://schemas.openxmlformats.org/drawingml/2006/main" xmlns:r="http://schemas.openxmlformats.org/officeDocument/2006/relationships" xmlns:p="http://schemas.openxmlformats.org/presentationml/2006/main">
   <p:cSld>
     <p:spTree>
       <p:nvGrpSpPr>
@@ -4457,7 +4626,14 @@
         <p:cNvGrpSpPr/>
         <p:nvPr/>
       </p:nvGrpSpPr>
-      <p:grpSpPr/>
+      <p:grpSpPr>
+        <a:xfrm>
+          <a:off x="0" y="0"/>
+          <a:ext cx="0" cy="0"/>
+          <a:chOff x="0" y="0"/>
+          <a:chExt cx="0" cy="0"/>
+        </a:xfrm>
+      </p:grpSpPr>
       <p:sp>
         <p:nvSpPr>
           <p:cNvPr id="2" name="Title 1"/>
@@ -4545,8 +4721,8 @@
         </p:blipFill>
         <p:spPr>
           <a:xfrm>
-            <a:off x="1828800" y="2011680"/>
-            <a:ext cx="8503920" cy="4389120"/>
+            <a:off x="3064475" y="2867365"/>
+            <a:ext cx="6934612" cy="3579155"/>
           </a:xfrm>
           <a:prstGeom prst="rect">
             <a:avLst/>
@@ -4593,7 +4769,7 @@
 </file>
 
 <file path=ppt/slides/slide9.xml><?xml version="1.0" encoding="utf-8"?>
-<p:sld xmlns:a="http://schemas.openxmlformats.org/drawingml/2006/main" xmlns:p="http://schemas.openxmlformats.org/presentationml/2006/main" xmlns:r="http://schemas.openxmlformats.org/officeDocument/2006/relationships">
+<p:sld xmlns:a="http://schemas.openxmlformats.org/drawingml/2006/main" xmlns:r="http://schemas.openxmlformats.org/officeDocument/2006/relationships" xmlns:p="http://schemas.openxmlformats.org/presentationml/2006/main">
   <p:cSld>
     <p:spTree>
       <p:nvGrpSpPr>
@@ -4601,7 +4777,14 @@
         <p:cNvGrpSpPr/>
         <p:nvPr/>
       </p:nvGrpSpPr>
-      <p:grpSpPr/>
+      <p:grpSpPr>
+        <a:xfrm>
+          <a:off x="0" y="0"/>
+          <a:ext cx="0" cy="0"/>
+          <a:chOff x="0" y="0"/>
+          <a:chExt cx="0" cy="0"/>
+        </a:xfrm>
+      </p:grpSpPr>
       <p:sp>
         <p:nvSpPr>
           <p:cNvPr id="2" name="Title 1"/>
@@ -4681,7 +4864,7 @@
         </p:nvSpPr>
         <p:spPr>
           <a:xfrm>
-            <a:off x="6949440" y="1554480"/>
+            <a:off x="6888480" y="2468880"/>
             <a:ext cx="4572000" cy="4389120"/>
           </a:xfrm>
           <a:prstGeom prst="rect">
@@ -4699,6 +4882,7 @@
               <a:defRPr sz="1600"/>
             </a:pPr>
             <a:r>
+              <a:rPr dirty="0"/>
               <a:t>Top positive words</a:t>
             </a:r>
           </a:p>
@@ -4707,6 +4891,7 @@
               <a:defRPr sz="1600"/>
             </a:pPr>
             <a:r>
+              <a:rPr dirty="0"/>
               <a:t>- best</a:t>
             </a:r>
           </a:p>
@@ -4715,6 +4900,7 @@
               <a:defRPr sz="1600"/>
             </a:pPr>
             <a:r>
+              <a:rPr dirty="0"/>
               <a:t>- great</a:t>
             </a:r>
           </a:p>
@@ -4723,6 +4909,7 @@
               <a:defRPr sz="1600"/>
             </a:pPr>
             <a:r>
+              <a:rPr dirty="0"/>
               <a:t>- amazing</a:t>
             </a:r>
           </a:p>
@@ -4731,6 +4918,7 @@
               <a:defRPr sz="1600"/>
             </a:pPr>
             <a:r>
+              <a:rPr dirty="0"/>
               <a:t>- the best</a:t>
             </a:r>
           </a:p>
@@ -4739,6 +4927,7 @@
               <a:defRPr sz="1600"/>
             </a:pPr>
             <a:r>
+              <a:rPr dirty="0"/>
               <a:t>- so good</a:t>
             </a:r>
           </a:p>
@@ -4746,12 +4935,14 @@
             <a:pPr>
               <a:defRPr sz="1600"/>
             </a:pPr>
+            <a:endParaRPr dirty="0"/>
           </a:p>
           <a:p>
             <a:pPr>
               <a:defRPr sz="1600"/>
             </a:pPr>
             <a:r>
+              <a:rPr dirty="0"/>
               <a:t>Top negative words</a:t>
             </a:r>
           </a:p>
@@ -4760,6 +4951,7 @@
               <a:defRPr sz="1600"/>
             </a:pPr>
             <a:r>
+              <a:rPr dirty="0"/>
               <a:t>- worst</a:t>
             </a:r>
           </a:p>
@@ -4768,6 +4960,7 @@
               <a:defRPr sz="1600"/>
             </a:pPr>
             <a:r>
+              <a:rPr dirty="0"/>
               <a:t>- not</a:t>
             </a:r>
           </a:p>
@@ -4776,6 +4969,7 @@
               <a:defRPr sz="1600"/>
             </a:pPr>
             <a:r>
+              <a:rPr dirty="0"/>
               <a:t>- rude</a:t>
             </a:r>
           </a:p>
@@ -4784,6 +4978,7 @@
               <a:defRPr sz="1600"/>
             </a:pPr>
             <a:r>
+              <a:rPr dirty="0"/>
               <a:t>- the worst</a:t>
             </a:r>
           </a:p>
@@ -4792,6 +4987,7 @@
               <a:defRPr sz="1600"/>
             </a:pPr>
             <a:r>
+              <a:rPr dirty="0"/>
               <a:t>- bad</a:t>
             </a:r>
           </a:p>

</xml_diff>